<commit_message>
add some materials for 4th and 5th lessons
</commit_message>
<xml_diff>
--- a/network_introduction_2022/material/ip_exercises.pptx
+++ b/network_introduction_2022/material/ip_exercises.pptx
@@ -9,6 +9,7 @@
     <p:sldId id="280" r:id="rId3"/>
     <p:sldId id="281" r:id="rId4"/>
     <p:sldId id="282" r:id="rId5"/>
+    <p:sldId id="283" r:id="rId6"/>
   </p:sldIdLst>
   <p:sldSz cx="12192000" cy="6858000"/>
   <p:notesSz cx="6858000" cy="9144000"/>
@@ -273,7 +274,7 @@
           <a:p>
             <a:fld id="{D8B7E551-822F-4896-9EDE-9E8F0CB865CE}" type="datetimeFigureOut">
               <a:rPr lang="it-IT" smtClean="0"/>
-              <a:t>11/12/2022</a:t>
+              <a:t>12/12/2022</a:t>
             </a:fld>
             <a:endParaRPr lang="it-IT"/>
           </a:p>
@@ -471,7 +472,7 @@
           <a:p>
             <a:fld id="{D8B7E551-822F-4896-9EDE-9E8F0CB865CE}" type="datetimeFigureOut">
               <a:rPr lang="it-IT" smtClean="0"/>
-              <a:t>11/12/2022</a:t>
+              <a:t>12/12/2022</a:t>
             </a:fld>
             <a:endParaRPr lang="it-IT"/>
           </a:p>
@@ -679,7 +680,7 @@
           <a:p>
             <a:fld id="{D8B7E551-822F-4896-9EDE-9E8F0CB865CE}" type="datetimeFigureOut">
               <a:rPr lang="it-IT" smtClean="0"/>
-              <a:t>11/12/2022</a:t>
+              <a:t>12/12/2022</a:t>
             </a:fld>
             <a:endParaRPr lang="it-IT"/>
           </a:p>
@@ -877,7 +878,7 @@
           <a:p>
             <a:fld id="{D8B7E551-822F-4896-9EDE-9E8F0CB865CE}" type="datetimeFigureOut">
               <a:rPr lang="it-IT" smtClean="0"/>
-              <a:t>11/12/2022</a:t>
+              <a:t>12/12/2022</a:t>
             </a:fld>
             <a:endParaRPr lang="it-IT"/>
           </a:p>
@@ -1152,7 +1153,7 @@
           <a:p>
             <a:fld id="{D8B7E551-822F-4896-9EDE-9E8F0CB865CE}" type="datetimeFigureOut">
               <a:rPr lang="it-IT" smtClean="0"/>
-              <a:t>11/12/2022</a:t>
+              <a:t>12/12/2022</a:t>
             </a:fld>
             <a:endParaRPr lang="it-IT"/>
           </a:p>
@@ -1417,7 +1418,7 @@
           <a:p>
             <a:fld id="{D8B7E551-822F-4896-9EDE-9E8F0CB865CE}" type="datetimeFigureOut">
               <a:rPr lang="it-IT" smtClean="0"/>
-              <a:t>11/12/2022</a:t>
+              <a:t>12/12/2022</a:t>
             </a:fld>
             <a:endParaRPr lang="it-IT"/>
           </a:p>
@@ -1829,7 +1830,7 @@
           <a:p>
             <a:fld id="{D8B7E551-822F-4896-9EDE-9E8F0CB865CE}" type="datetimeFigureOut">
               <a:rPr lang="it-IT" smtClean="0"/>
-              <a:t>11/12/2022</a:t>
+              <a:t>12/12/2022</a:t>
             </a:fld>
             <a:endParaRPr lang="it-IT"/>
           </a:p>
@@ -1970,7 +1971,7 @@
           <a:p>
             <a:fld id="{D8B7E551-822F-4896-9EDE-9E8F0CB865CE}" type="datetimeFigureOut">
               <a:rPr lang="it-IT" smtClean="0"/>
-              <a:t>11/12/2022</a:t>
+              <a:t>12/12/2022</a:t>
             </a:fld>
             <a:endParaRPr lang="it-IT"/>
           </a:p>
@@ -2083,7 +2084,7 @@
           <a:p>
             <a:fld id="{D8B7E551-822F-4896-9EDE-9E8F0CB865CE}" type="datetimeFigureOut">
               <a:rPr lang="it-IT" smtClean="0"/>
-              <a:t>11/12/2022</a:t>
+              <a:t>12/12/2022</a:t>
             </a:fld>
             <a:endParaRPr lang="it-IT"/>
           </a:p>
@@ -2394,7 +2395,7 @@
           <a:p>
             <a:fld id="{D8B7E551-822F-4896-9EDE-9E8F0CB865CE}" type="datetimeFigureOut">
               <a:rPr lang="it-IT" smtClean="0"/>
-              <a:t>11/12/2022</a:t>
+              <a:t>12/12/2022</a:t>
             </a:fld>
             <a:endParaRPr lang="it-IT"/>
           </a:p>
@@ -2682,7 +2683,7 @@
           <a:p>
             <a:fld id="{D8B7E551-822F-4896-9EDE-9E8F0CB865CE}" type="datetimeFigureOut">
               <a:rPr lang="it-IT" smtClean="0"/>
-              <a:t>11/12/2022</a:t>
+              <a:t>12/12/2022</a:t>
             </a:fld>
             <a:endParaRPr lang="it-IT"/>
           </a:p>
@@ -2923,7 +2924,7 @@
           <a:p>
             <a:fld id="{D8B7E551-822F-4896-9EDE-9E8F0CB865CE}" type="datetimeFigureOut">
               <a:rPr lang="it-IT" smtClean="0"/>
-              <a:t>11/12/2022</a:t>
+              <a:t>12/12/2022</a:t>
             </a:fld>
             <a:endParaRPr lang="it-IT"/>
           </a:p>
@@ -4183,6 +4184,306 @@
 </p:sld>
 </file>
 
+<file path=ppt/slides/slide5.xml><?xml version="1.0" encoding="utf-8"?>
+<p:sld xmlns:a="http://schemas.openxmlformats.org/drawingml/2006/main" xmlns:r="http://schemas.openxmlformats.org/officeDocument/2006/relationships" xmlns:p="http://schemas.openxmlformats.org/presentationml/2006/main">
+  <p:cSld>
+    <p:spTree>
+      <p:nvGrpSpPr>
+        <p:cNvPr id="1" name=""/>
+        <p:cNvGrpSpPr/>
+        <p:nvPr/>
+      </p:nvGrpSpPr>
+      <p:grpSpPr>
+        <a:xfrm>
+          <a:off x="0" y="0"/>
+          <a:ext cx="0" cy="0"/>
+          <a:chOff x="0" y="0"/>
+          <a:chExt cx="0" cy="0"/>
+        </a:xfrm>
+      </p:grpSpPr>
+      <p:sp>
+        <p:nvSpPr>
+          <p:cNvPr id="5" name="Rettangolo con angoli arrotondati 4">
+            <a:extLst>
+              <a:ext uri="{FF2B5EF4-FFF2-40B4-BE49-F238E27FC236}">
+                <a16:creationId xmlns:a16="http://schemas.microsoft.com/office/drawing/2014/main" id="{9B281B25-3E31-EC1A-BB8F-795A8CC896CB}"/>
+              </a:ext>
+            </a:extLst>
+          </p:cNvPr>
+          <p:cNvSpPr/>
+          <p:nvPr/>
+        </p:nvSpPr>
+        <p:spPr>
+          <a:xfrm>
+            <a:off x="1381897" y="521279"/>
+            <a:ext cx="9428206" cy="1013254"/>
+          </a:xfrm>
+          <a:prstGeom prst="roundRect">
+            <a:avLst/>
+          </a:prstGeom>
+        </p:spPr>
+        <p:style>
+          <a:lnRef idx="2">
+            <a:schemeClr val="dk1">
+              <a:shade val="50000"/>
+            </a:schemeClr>
+          </a:lnRef>
+          <a:fillRef idx="1">
+            <a:schemeClr val="dk1"/>
+          </a:fillRef>
+          <a:effectRef idx="0">
+            <a:schemeClr val="dk1"/>
+          </a:effectRef>
+          <a:fontRef idx="minor">
+            <a:schemeClr val="lt1"/>
+          </a:fontRef>
+        </p:style>
+        <p:txBody>
+          <a:bodyPr rtlCol="0" anchor="ctr"/>
+          <a:lstStyle/>
+          <a:p>
+            <a:pPr algn="ctr"/>
+            <a:endParaRPr lang="it-IT"/>
+          </a:p>
+        </p:txBody>
+      </p:sp>
+      <p:sp>
+        <p:nvSpPr>
+          <p:cNvPr id="2" name="Titolo 1">
+            <a:extLst>
+              <a:ext uri="{FF2B5EF4-FFF2-40B4-BE49-F238E27FC236}">
+                <a16:creationId xmlns:a16="http://schemas.microsoft.com/office/drawing/2014/main" id="{89482AAA-D49C-41CC-87C3-E210C152BED8}"/>
+              </a:ext>
+            </a:extLst>
+          </p:cNvPr>
+          <p:cNvSpPr>
+            <a:spLocks noGrp="1"/>
+          </p:cNvSpPr>
+          <p:nvPr>
+            <p:ph type="title"/>
+          </p:nvPr>
+        </p:nvSpPr>
+        <p:spPr/>
+        <p:txBody>
+          <a:bodyPr>
+            <a:normAutofit/>
+          </a:bodyPr>
+          <a:lstStyle/>
+          <a:p>
+            <a:pPr algn="ctr"/>
+            <a:r>
+              <a:rPr lang="it-IT" sz="4800" dirty="0">
+                <a:solidFill>
+                  <a:schemeClr val="bg1"/>
+                </a:solidFill>
+                <a:latin typeface="Print Clearly" panose="02000000000000000000" pitchFamily="50" charset="0"/>
+              </a:rPr>
+              <a:t>Esercizio 4</a:t>
+            </a:r>
+          </a:p>
+        </p:txBody>
+      </p:sp>
+      <p:sp>
+        <p:nvSpPr>
+          <p:cNvPr id="28" name="Segnaposto contenuto 27">
+            <a:extLst>
+              <a:ext uri="{FF2B5EF4-FFF2-40B4-BE49-F238E27FC236}">
+                <a16:creationId xmlns:a16="http://schemas.microsoft.com/office/drawing/2014/main" id="{84105A06-87CB-83CE-05B0-FB5BAAF84C4A}"/>
+              </a:ext>
+            </a:extLst>
+          </p:cNvPr>
+          <p:cNvSpPr>
+            <a:spLocks noGrp="1"/>
+          </p:cNvSpPr>
+          <p:nvPr>
+            <p:ph idx="1"/>
+          </p:nvPr>
+        </p:nvSpPr>
+        <p:spPr/>
+        <p:txBody>
+          <a:bodyPr>
+            <a:noAutofit/>
+          </a:bodyPr>
+          <a:lstStyle/>
+          <a:p>
+            <a:r>
+              <a:rPr lang="it-IT" sz="1800" dirty="0"/>
+              <a:t>Proporre un piano di indirizzamento per la rete 172.18.0.0 /16. Le sottoreti di cui necessita l’organizzazione sono:</a:t>
+            </a:r>
+          </a:p>
+          <a:p>
+            <a:r>
+              <a:rPr lang="it-IT" sz="1800" dirty="0"/>
+              <a:t>1 rete da 1000 </a:t>
+            </a:r>
+            <a:r>
+              <a:rPr lang="it-IT" sz="1800" dirty="0" err="1"/>
+              <a:t>host</a:t>
+            </a:r>
+            <a:endParaRPr lang="it-IT" sz="1800" dirty="0"/>
+          </a:p>
+          <a:p>
+            <a:r>
+              <a:rPr lang="it-IT" sz="1800" dirty="0"/>
+              <a:t>1 rete da 800 </a:t>
+            </a:r>
+            <a:r>
+              <a:rPr lang="it-IT" sz="1800" dirty="0" err="1"/>
+              <a:t>host</a:t>
+            </a:r>
+            <a:endParaRPr lang="it-IT" sz="1800" dirty="0"/>
+          </a:p>
+          <a:p>
+            <a:r>
+              <a:rPr lang="it-IT" sz="1800" dirty="0"/>
+              <a:t>1 rete da 700 </a:t>
+            </a:r>
+            <a:r>
+              <a:rPr lang="it-IT" sz="1800" dirty="0" err="1"/>
+              <a:t>host</a:t>
+            </a:r>
+            <a:endParaRPr lang="it-IT" sz="1800" dirty="0"/>
+          </a:p>
+          <a:p>
+            <a:r>
+              <a:rPr lang="it-IT" sz="1800" dirty="0"/>
+              <a:t>1 rete da 500 </a:t>
+            </a:r>
+            <a:r>
+              <a:rPr lang="it-IT" sz="1800" dirty="0" err="1"/>
+              <a:t>host</a:t>
+            </a:r>
+            <a:endParaRPr lang="it-IT" sz="1800" dirty="0"/>
+          </a:p>
+          <a:p>
+            <a:r>
+              <a:rPr lang="it-IT" sz="1800" dirty="0"/>
+              <a:t>1 rete da 400 </a:t>
+            </a:r>
+            <a:r>
+              <a:rPr lang="it-IT" sz="1800" dirty="0" err="1"/>
+              <a:t>host</a:t>
+            </a:r>
+            <a:endParaRPr lang="it-IT" sz="1800" dirty="0"/>
+          </a:p>
+          <a:p>
+            <a:r>
+              <a:rPr lang="it-IT" sz="1800" dirty="0"/>
+              <a:t>1 rete da 100 </a:t>
+            </a:r>
+            <a:r>
+              <a:rPr lang="it-IT" sz="1800" dirty="0" err="1"/>
+              <a:t>host</a:t>
+            </a:r>
+            <a:endParaRPr lang="it-IT" sz="1800" dirty="0"/>
+          </a:p>
+          <a:p>
+            <a:r>
+              <a:rPr lang="it-IT" sz="1800" dirty="0"/>
+              <a:t>1 rete da 60 </a:t>
+            </a:r>
+            <a:r>
+              <a:rPr lang="it-IT" sz="1800" dirty="0" err="1"/>
+              <a:t>host</a:t>
+            </a:r>
+            <a:endParaRPr lang="it-IT" sz="1800" dirty="0"/>
+          </a:p>
+          <a:p>
+            <a:r>
+              <a:rPr lang="it-IT" sz="1800" dirty="0"/>
+              <a:t>2 reti da 12 </a:t>
+            </a:r>
+            <a:r>
+              <a:rPr lang="it-IT" sz="1800" dirty="0" err="1"/>
+              <a:t>host</a:t>
+            </a:r>
+            <a:endParaRPr lang="it-IT" sz="1800" dirty="0"/>
+          </a:p>
+          <a:p>
+            <a:r>
+              <a:rPr lang="it-IT" sz="1800" dirty="0"/>
+              <a:t>1 rete da 10 </a:t>
+            </a:r>
+            <a:r>
+              <a:rPr lang="it-IT" sz="1800" dirty="0" err="1"/>
+              <a:t>host</a:t>
+            </a:r>
+            <a:endParaRPr lang="it-IT" sz="1800" dirty="0"/>
+          </a:p>
+          <a:p>
+            <a:r>
+              <a:rPr lang="it-IT" sz="1800" dirty="0"/>
+              <a:t>2 reti da 2 </a:t>
+            </a:r>
+            <a:r>
+              <a:rPr lang="it-IT" sz="1800" dirty="0" err="1"/>
+              <a:t>host</a:t>
+            </a:r>
+            <a:endParaRPr lang="it-IT" sz="1800" dirty="0"/>
+          </a:p>
+        </p:txBody>
+      </p:sp>
+      <p:pic>
+        <p:nvPicPr>
+          <p:cNvPr id="4" name="Immagine 3">
+            <a:extLst>
+              <a:ext uri="{FF2B5EF4-FFF2-40B4-BE49-F238E27FC236}">
+                <a16:creationId xmlns:a16="http://schemas.microsoft.com/office/drawing/2014/main" id="{D77C5866-A614-48DA-8D6D-4A9AAB8F9B0D}"/>
+              </a:ext>
+            </a:extLst>
+          </p:cNvPr>
+          <p:cNvPicPr>
+            <a:picLocks noChangeAspect="1"/>
+          </p:cNvPicPr>
+          <p:nvPr/>
+        </p:nvPicPr>
+        <p:blipFill>
+          <a:blip r:embed="rId2">
+            <a:extLst>
+              <a:ext uri="{28A0092B-C50C-407E-A947-70E740481C1C}">
+                <a14:useLocalDpi xmlns:a14="http://schemas.microsoft.com/office/drawing/2010/main" val="0"/>
+              </a:ext>
+            </a:extLst>
+          </a:blip>
+          <a:stretch>
+            <a:fillRect/>
+          </a:stretch>
+        </p:blipFill>
+        <p:spPr>
+          <a:xfrm>
+            <a:off x="9441877" y="6129856"/>
+            <a:ext cx="2414146" cy="397754"/>
+          </a:xfrm>
+          <a:prstGeom prst="rect">
+            <a:avLst/>
+          </a:prstGeom>
+        </p:spPr>
+      </p:pic>
+    </p:spTree>
+    <p:extLst>
+      <p:ext uri="{BB962C8B-B14F-4D97-AF65-F5344CB8AC3E}">
+        <p14:creationId xmlns:p14="http://schemas.microsoft.com/office/powerpoint/2010/main" val="4246339849"/>
+      </p:ext>
+    </p:extLst>
+  </p:cSld>
+  <p:clrMapOvr>
+    <a:masterClrMapping/>
+  </p:clrMapOvr>
+  <mc:AlternateContent xmlns:mc="http://schemas.openxmlformats.org/markup-compatibility/2006" xmlns:p159="http://schemas.microsoft.com/office/powerpoint/2015/09/main">
+    <mc:Choice Requires="p159">
+      <p:transition xmlns:p14="http://schemas.microsoft.com/office/powerpoint/2010/main" spd="slow" p14:dur="2000">
+        <p159:morph option="byObject"/>
+      </p:transition>
+    </mc:Choice>
+    <mc:Fallback xmlns="">
+      <p:transition spd="slow">
+        <p:fade/>
+      </p:transition>
+    </mc:Fallback>
+  </mc:AlternateContent>
+</p:sld>
+</file>
+
 <file path=ppt/theme/theme1.xml><?xml version="1.0" encoding="utf-8"?>
 <a:theme xmlns:a="http://schemas.openxmlformats.org/drawingml/2006/main" name="Tema di Office">
   <a:themeElements>

</xml_diff>